<commit_message>
adding eclipse and tomcat directions
</commit_message>
<xml_diff>
--- a/slides/Debugging_Huda.pptx
+++ b/slides/Debugging_Huda.pptx
@@ -223,7 +223,7 @@
           <a:p>
             <a:fld id="{C9EE556F-AA56-4B83-957B-C958A23266ED}" type="datetimeFigureOut">
               <a:rPr lang="en-US" smtClean="0"/>
-              <a:t>6/4/2018</a:t>
+              <a:t>6/5/2018</a:t>
             </a:fld>
             <a:endParaRPr lang="en-US"/>
           </a:p>
@@ -1269,7 +1269,7 @@
           <a:p>
             <a:fld id="{E8885F0B-F507-4DC6-84A7-B5610C846E87}" type="datetimeFigureOut">
               <a:rPr lang="en-US" smtClean="0"/>
-              <a:t>6/4/2018</a:t>
+              <a:t>6/5/2018</a:t>
             </a:fld>
             <a:endParaRPr lang="en-US"/>
           </a:p>
@@ -1439,7 +1439,7 @@
           <a:p>
             <a:fld id="{E8885F0B-F507-4DC6-84A7-B5610C846E87}" type="datetimeFigureOut">
               <a:rPr lang="en-US" smtClean="0"/>
-              <a:t>6/4/2018</a:t>
+              <a:t>6/5/2018</a:t>
             </a:fld>
             <a:endParaRPr lang="en-US"/>
           </a:p>
@@ -1619,7 +1619,7 @@
           <a:p>
             <a:fld id="{E8885F0B-F507-4DC6-84A7-B5610C846E87}" type="datetimeFigureOut">
               <a:rPr lang="en-US" smtClean="0"/>
-              <a:t>6/4/2018</a:t>
+              <a:t>6/5/2018</a:t>
             </a:fld>
             <a:endParaRPr lang="en-US"/>
           </a:p>
@@ -1789,7 +1789,7 @@
           <a:p>
             <a:fld id="{E8885F0B-F507-4DC6-84A7-B5610C846E87}" type="datetimeFigureOut">
               <a:rPr lang="en-US" smtClean="0"/>
-              <a:t>6/4/2018</a:t>
+              <a:t>6/5/2018</a:t>
             </a:fld>
             <a:endParaRPr lang="en-US"/>
           </a:p>
@@ -2035,7 +2035,7 @@
           <a:p>
             <a:fld id="{E8885F0B-F507-4DC6-84A7-B5610C846E87}" type="datetimeFigureOut">
               <a:rPr lang="en-US" smtClean="0"/>
-              <a:t>6/4/2018</a:t>
+              <a:t>6/5/2018</a:t>
             </a:fld>
             <a:endParaRPr lang="en-US"/>
           </a:p>
@@ -2267,7 +2267,7 @@
           <a:p>
             <a:fld id="{E8885F0B-F507-4DC6-84A7-B5610C846E87}" type="datetimeFigureOut">
               <a:rPr lang="en-US" smtClean="0"/>
-              <a:t>6/4/2018</a:t>
+              <a:t>6/5/2018</a:t>
             </a:fld>
             <a:endParaRPr lang="en-US"/>
           </a:p>
@@ -2634,7 +2634,7 @@
           <a:p>
             <a:fld id="{E8885F0B-F507-4DC6-84A7-B5610C846E87}" type="datetimeFigureOut">
               <a:rPr lang="en-US" smtClean="0"/>
-              <a:t>6/4/2018</a:t>
+              <a:t>6/5/2018</a:t>
             </a:fld>
             <a:endParaRPr lang="en-US"/>
           </a:p>
@@ -2752,7 +2752,7 @@
           <a:p>
             <a:fld id="{E8885F0B-F507-4DC6-84A7-B5610C846E87}" type="datetimeFigureOut">
               <a:rPr lang="en-US" smtClean="0"/>
-              <a:t>6/4/2018</a:t>
+              <a:t>6/5/2018</a:t>
             </a:fld>
             <a:endParaRPr lang="en-US"/>
           </a:p>
@@ -2847,7 +2847,7 @@
           <a:p>
             <a:fld id="{E8885F0B-F507-4DC6-84A7-B5610C846E87}" type="datetimeFigureOut">
               <a:rPr lang="en-US" smtClean="0"/>
-              <a:t>6/4/2018</a:t>
+              <a:t>6/5/2018</a:t>
             </a:fld>
             <a:endParaRPr lang="en-US"/>
           </a:p>
@@ -3124,7 +3124,7 @@
           <a:p>
             <a:fld id="{E8885F0B-F507-4DC6-84A7-B5610C846E87}" type="datetimeFigureOut">
               <a:rPr lang="en-US" smtClean="0"/>
-              <a:t>6/4/2018</a:t>
+              <a:t>6/5/2018</a:t>
             </a:fld>
             <a:endParaRPr lang="en-US"/>
           </a:p>
@@ -3377,7 +3377,7 @@
           <a:p>
             <a:fld id="{E8885F0B-F507-4DC6-84A7-B5610C846E87}" type="datetimeFigureOut">
               <a:rPr lang="en-US" smtClean="0"/>
-              <a:t>6/4/2018</a:t>
+              <a:t>6/5/2018</a:t>
             </a:fld>
             <a:endParaRPr lang="en-US"/>
           </a:p>
@@ -3590,7 +3590,7 @@
           <a:p>
             <a:fld id="{E8885F0B-F507-4DC6-84A7-B5610C846E87}" type="datetimeFigureOut">
               <a:rPr lang="en-US" smtClean="0"/>
-              <a:t>6/4/2018</a:t>
+              <a:t>6/5/2018</a:t>
             </a:fld>
             <a:endParaRPr lang="en-US"/>
           </a:p>
@@ -7347,8 +7347,118 @@
           <a:lstStyle/>
           <a:p>
             <a:r>
+              <a:rPr lang="en-US" dirty="0" smtClean="0"/>
+              <a:t>Can try</a:t>
+            </a:r>
+            <a:r>
               <a:rPr lang="en-US" dirty="0"/>
-              <a:t>https://wiki.apache.org/tomcat/FAQ/Developing#Q2</a:t>
+              <a:t> </a:t>
+            </a:r>
+            <a:r>
+              <a:rPr lang="en-US" dirty="0" smtClean="0">
+                <a:hlinkClick r:id="rId2"/>
+              </a:rPr>
+              <a:t>https</a:t>
+            </a:r>
+            <a:r>
+              <a:rPr lang="en-US" dirty="0">
+                <a:hlinkClick r:id="rId2"/>
+              </a:rPr>
+              <a:t>://</a:t>
+            </a:r>
+            <a:r>
+              <a:rPr lang="en-US" dirty="0" smtClean="0">
+                <a:hlinkClick r:id="rId2"/>
+              </a:rPr>
+              <a:t>marketplace.eclipse.org/content/eclipse-tomcat-plugin</a:t>
+            </a:r>
+            <a:endParaRPr lang="en-US" dirty="0"/>
+          </a:p>
+          <a:p>
+            <a:r>
+              <a:rPr lang="en-US" dirty="0" smtClean="0">
+                <a:hlinkClick r:id="rId3"/>
+              </a:rPr>
+              <a:t>https</a:t>
+            </a:r>
+            <a:r>
+              <a:rPr lang="en-US" dirty="0">
+                <a:hlinkClick r:id="rId3"/>
+              </a:rPr>
+              <a:t>://</a:t>
+            </a:r>
+            <a:r>
+              <a:rPr lang="en-US" dirty="0" smtClean="0">
+                <a:hlinkClick r:id="rId3"/>
+              </a:rPr>
+              <a:t>blogs.mulesoft.com/dev/tomcat-tcat-server/debugging-your-tomcat-webapp-with-eclipse</a:t>
+            </a:r>
+            <a:endParaRPr lang="en-US" dirty="0" smtClean="0"/>
+          </a:p>
+          <a:p>
+            <a:pPr lvl="1"/>
+            <a:r>
+              <a:rPr lang="en-US" dirty="0" smtClean="0"/>
+              <a:t>Go to tomcat bin directory: </a:t>
+            </a:r>
+            <a:r>
+              <a:rPr lang="en-US" dirty="0" err="1" smtClean="0"/>
+              <a:t>catalina</a:t>
+            </a:r>
+            <a:r>
+              <a:rPr lang="en-US" dirty="0" smtClean="0"/>
+              <a:t> </a:t>
+            </a:r>
+            <a:r>
+              <a:rPr lang="en-US" dirty="0" err="1" smtClean="0"/>
+              <a:t>jpda</a:t>
+            </a:r>
+            <a:r>
+              <a:rPr lang="en-US" dirty="0" smtClean="0"/>
+              <a:t> start</a:t>
+            </a:r>
+          </a:p>
+          <a:p>
+            <a:pPr lvl="1"/>
+            <a:r>
+              <a:rPr lang="en-US" dirty="0" smtClean="0"/>
+              <a:t>In eclipse:</a:t>
+            </a:r>
+          </a:p>
+          <a:p>
+            <a:pPr lvl="2"/>
+            <a:r>
+              <a:rPr lang="en-US" dirty="0" smtClean="0"/>
+              <a:t>Run -&gt; Debug Configuration -&gt; Remote Java Application.  Right click and select “New”.</a:t>
+            </a:r>
+          </a:p>
+          <a:p>
+            <a:pPr lvl="2"/>
+            <a:r>
+              <a:rPr lang="en-US" dirty="0" smtClean="0"/>
+              <a:t>Name “tomcat (local)”</a:t>
+            </a:r>
+          </a:p>
+          <a:p>
+            <a:pPr lvl="2"/>
+            <a:r>
+              <a:rPr lang="en-US" dirty="0" smtClean="0"/>
+              <a:t> Project: vivo-</a:t>
+            </a:r>
+            <a:r>
+              <a:rPr lang="en-US" dirty="0" err="1" smtClean="0"/>
+              <a:t>api</a:t>
+            </a:r>
+            <a:r>
+              <a:rPr lang="en-US" dirty="0" smtClean="0"/>
+              <a:t> </a:t>
+            </a:r>
+          </a:p>
+          <a:p>
+            <a:pPr lvl="2"/>
+            <a:r>
+              <a:rPr lang="en-US" dirty="0" smtClean="0"/>
+              <a:t>Select Apply and then Debug</a:t>
             </a:r>
           </a:p>
         </p:txBody>

</xml_diff>